<commit_message>
fig with no dots
</commit_message>
<xml_diff>
--- a/figures/Fig2_cline_only.pptx
+++ b/figures/Fig2_cline_only.pptx
@@ -5,7 +5,8 @@
     <p:sldMasterId id="2147483648" r:id="rId1"/>
   </p:sldMasterIdLst>
   <p:sldIdLst>
-    <p:sldId id="256" r:id="rId2"/>
+    <p:sldId id="258" r:id="rId2"/>
+    <p:sldId id="256" r:id="rId3"/>
   </p:sldIdLst>
   <p:sldSz cx="12192000" cy="6858000"/>
   <p:notesSz cx="6858000" cy="9144000"/>
@@ -129,7 +130,7 @@
           <p:cNvPr id="2" name="Title 1">
             <a:extLst>
               <a:ext uri="{FF2B5EF4-FFF2-40B4-BE49-F238E27FC236}">
-                <a16:creationId xmlns:a16="http://schemas.microsoft.com/office/drawing/2014/main" id="{5F2B4C38-A935-7548-BAB6-F1B174AFC70E}"/>
+                <a16:creationId xmlns:a16="http://schemas.microsoft.com/office/drawing/2014/main" id="{6A02B788-5FDF-DB44-B139-6AF556DD66F1}"/>
               </a:ext>
             </a:extLst>
           </p:cNvPr>
@@ -155,10 +156,9 @@
           </a:lstStyle>
           <a:p>
             <a:r>
-              <a:rPr lang="en-US"/>
+              <a:rPr lang="en-GB"/>
               <a:t>Click to edit Master title style</a:t>
             </a:r>
-            <a:endParaRPr lang="en-GB"/>
           </a:p>
         </p:txBody>
       </p:sp>
@@ -167,7 +167,7 @@
           <p:cNvPr id="3" name="Subtitle 2">
             <a:extLst>
               <a:ext uri="{FF2B5EF4-FFF2-40B4-BE49-F238E27FC236}">
-                <a16:creationId xmlns:a16="http://schemas.microsoft.com/office/drawing/2014/main" id="{BE5D4479-A490-8749-A32A-8E10A5E5040C}"/>
+                <a16:creationId xmlns:a16="http://schemas.microsoft.com/office/drawing/2014/main" id="{B158AA23-E0B9-B84D-991B-A9322AABE9B7}"/>
               </a:ext>
             </a:extLst>
           </p:cNvPr>
@@ -226,10 +226,9 @@
           </a:lstStyle>
           <a:p>
             <a:r>
-              <a:rPr lang="en-US"/>
+              <a:rPr lang="en-GB"/>
               <a:t>Click to edit Master subtitle style</a:t>
             </a:r>
-            <a:endParaRPr lang="en-GB"/>
           </a:p>
         </p:txBody>
       </p:sp>
@@ -238,7 +237,7 @@
           <p:cNvPr id="4" name="Date Placeholder 3">
             <a:extLst>
               <a:ext uri="{FF2B5EF4-FFF2-40B4-BE49-F238E27FC236}">
-                <a16:creationId xmlns:a16="http://schemas.microsoft.com/office/drawing/2014/main" id="{2CAFD49C-972B-2547-A6D0-5B994FA9A170}"/>
+                <a16:creationId xmlns:a16="http://schemas.microsoft.com/office/drawing/2014/main" id="{DB29F914-4BF6-254A-8082-7DD3ACAEA833}"/>
               </a:ext>
             </a:extLst>
           </p:cNvPr>
@@ -254,9 +253,9 @@
           <a:bodyPr/>
           <a:lstStyle/>
           <a:p>
-            <a:fld id="{E25444B6-4230-B54C-BC2D-71877B2314F6}" type="datetimeFigureOut">
+            <a:fld id="{7FE2F37E-95F5-5141-BD82-756E4C53E23E}" type="datetimeFigureOut">
               <a:rPr lang="en-GB" smtClean="0"/>
-              <a:t>04/06/2020</a:t>
+              <a:t>28/08/2020</a:t>
             </a:fld>
             <a:endParaRPr lang="en-GB"/>
           </a:p>
@@ -267,7 +266,7 @@
           <p:cNvPr id="5" name="Footer Placeholder 4">
             <a:extLst>
               <a:ext uri="{FF2B5EF4-FFF2-40B4-BE49-F238E27FC236}">
-                <a16:creationId xmlns:a16="http://schemas.microsoft.com/office/drawing/2014/main" id="{CC349A24-3C9E-D345-AC16-B164F6CF2253}"/>
+                <a16:creationId xmlns:a16="http://schemas.microsoft.com/office/drawing/2014/main" id="{5A2B5EC0-6CF0-E543-97A1-AEC81E1FA324}"/>
               </a:ext>
             </a:extLst>
           </p:cNvPr>
@@ -292,7 +291,7 @@
           <p:cNvPr id="6" name="Slide Number Placeholder 5">
             <a:extLst>
               <a:ext uri="{FF2B5EF4-FFF2-40B4-BE49-F238E27FC236}">
-                <a16:creationId xmlns:a16="http://schemas.microsoft.com/office/drawing/2014/main" id="{FEDD5D67-FB0B-874B-82CD-1668F0A2C9F2}"/>
+                <a16:creationId xmlns:a16="http://schemas.microsoft.com/office/drawing/2014/main" id="{5ACBA673-9571-074D-8AC4-B97561020013}"/>
               </a:ext>
             </a:extLst>
           </p:cNvPr>
@@ -308,7 +307,7 @@
           <a:bodyPr/>
           <a:lstStyle/>
           <a:p>
-            <a:fld id="{C70D2932-F217-BB46-82F8-7E28C131F1E5}" type="slidenum">
+            <a:fld id="{DD114690-6977-EC47-97D1-6B6592B53DC2}" type="slidenum">
               <a:rPr lang="en-GB" smtClean="0"/>
               <a:t>‹#›</a:t>
             </a:fld>
@@ -319,7 +318,7 @@
     </p:spTree>
     <p:extLst>
       <p:ext uri="{BB962C8B-B14F-4D97-AF65-F5344CB8AC3E}">
-        <p14:creationId xmlns:p14="http://schemas.microsoft.com/office/powerpoint/2010/main" val="1764183205"/>
+        <p14:creationId xmlns:p14="http://schemas.microsoft.com/office/powerpoint/2010/main" val="3653384747"/>
       </p:ext>
     </p:extLst>
   </p:cSld>
@@ -351,7 +350,7 @@
           <p:cNvPr id="2" name="Title 1">
             <a:extLst>
               <a:ext uri="{FF2B5EF4-FFF2-40B4-BE49-F238E27FC236}">
-                <a16:creationId xmlns:a16="http://schemas.microsoft.com/office/drawing/2014/main" id="{128DC95B-4B36-D042-A38A-B81CC4B8D120}"/>
+                <a16:creationId xmlns:a16="http://schemas.microsoft.com/office/drawing/2014/main" id="{7F1CC6F7-88CF-A14D-BEEC-E7B4FED86A68}"/>
               </a:ext>
             </a:extLst>
           </p:cNvPr>
@@ -368,10 +367,9 @@
           <a:lstStyle/>
           <a:p>
             <a:r>
-              <a:rPr lang="en-US"/>
+              <a:rPr lang="en-GB"/>
               <a:t>Click to edit Master title style</a:t>
             </a:r>
-            <a:endParaRPr lang="en-GB"/>
           </a:p>
         </p:txBody>
       </p:sp>
@@ -380,7 +378,7 @@
           <p:cNvPr id="3" name="Vertical Text Placeholder 2">
             <a:extLst>
               <a:ext uri="{FF2B5EF4-FFF2-40B4-BE49-F238E27FC236}">
-                <a16:creationId xmlns:a16="http://schemas.microsoft.com/office/drawing/2014/main" id="{C59ACC39-EEFA-FA48-8998-6CDE3B83EF94}"/>
+                <a16:creationId xmlns:a16="http://schemas.microsoft.com/office/drawing/2014/main" id="{FAB35E77-38EF-544C-BE55-647EFDDB1225}"/>
               </a:ext>
             </a:extLst>
           </p:cNvPr>
@@ -398,38 +396,37 @@
           <a:p>
             <a:pPr lvl="0"/>
             <a:r>
-              <a:rPr lang="en-US"/>
-              <a:t>Edit Master text styles</a:t>
+              <a:rPr lang="en-GB"/>
+              <a:t>Click to edit Master text styles</a:t>
             </a:r>
           </a:p>
           <a:p>
             <a:pPr lvl="1"/>
             <a:r>
-              <a:rPr lang="en-US"/>
+              <a:rPr lang="en-GB"/>
               <a:t>Second level</a:t>
             </a:r>
           </a:p>
           <a:p>
             <a:pPr lvl="2"/>
             <a:r>
-              <a:rPr lang="en-US"/>
+              <a:rPr lang="en-GB"/>
               <a:t>Third level</a:t>
             </a:r>
           </a:p>
           <a:p>
             <a:pPr lvl="3"/>
             <a:r>
-              <a:rPr lang="en-US"/>
+              <a:rPr lang="en-GB"/>
               <a:t>Fourth level</a:t>
             </a:r>
           </a:p>
           <a:p>
             <a:pPr lvl="4"/>
             <a:r>
-              <a:rPr lang="en-US"/>
+              <a:rPr lang="en-GB"/>
               <a:t>Fifth level</a:t>
             </a:r>
-            <a:endParaRPr lang="en-GB"/>
           </a:p>
         </p:txBody>
       </p:sp>
@@ -438,7 +435,7 @@
           <p:cNvPr id="4" name="Date Placeholder 3">
             <a:extLst>
               <a:ext uri="{FF2B5EF4-FFF2-40B4-BE49-F238E27FC236}">
-                <a16:creationId xmlns:a16="http://schemas.microsoft.com/office/drawing/2014/main" id="{CCB4F062-7715-AA44-89A9-70F162C30937}"/>
+                <a16:creationId xmlns:a16="http://schemas.microsoft.com/office/drawing/2014/main" id="{4AB162FC-81DA-1A4D-936E-940EF1EFBD9C}"/>
               </a:ext>
             </a:extLst>
           </p:cNvPr>
@@ -454,9 +451,9 @@
           <a:bodyPr/>
           <a:lstStyle/>
           <a:p>
-            <a:fld id="{E25444B6-4230-B54C-BC2D-71877B2314F6}" type="datetimeFigureOut">
+            <a:fld id="{7FE2F37E-95F5-5141-BD82-756E4C53E23E}" type="datetimeFigureOut">
               <a:rPr lang="en-GB" smtClean="0"/>
-              <a:t>04/06/2020</a:t>
+              <a:t>28/08/2020</a:t>
             </a:fld>
             <a:endParaRPr lang="en-GB"/>
           </a:p>
@@ -467,7 +464,7 @@
           <p:cNvPr id="5" name="Footer Placeholder 4">
             <a:extLst>
               <a:ext uri="{FF2B5EF4-FFF2-40B4-BE49-F238E27FC236}">
-                <a16:creationId xmlns:a16="http://schemas.microsoft.com/office/drawing/2014/main" id="{7ADE09C1-84AB-FB45-842C-32F8348E2D38}"/>
+                <a16:creationId xmlns:a16="http://schemas.microsoft.com/office/drawing/2014/main" id="{F46FA767-BA8C-5D4E-9E0E-DBA1D56E5B46}"/>
               </a:ext>
             </a:extLst>
           </p:cNvPr>
@@ -492,7 +489,7 @@
           <p:cNvPr id="6" name="Slide Number Placeholder 5">
             <a:extLst>
               <a:ext uri="{FF2B5EF4-FFF2-40B4-BE49-F238E27FC236}">
-                <a16:creationId xmlns:a16="http://schemas.microsoft.com/office/drawing/2014/main" id="{3289653F-9FB6-0E40-BAB3-7F669386233F}"/>
+                <a16:creationId xmlns:a16="http://schemas.microsoft.com/office/drawing/2014/main" id="{E93F1690-E4F1-B64A-BB20-FB31BD633A59}"/>
               </a:ext>
             </a:extLst>
           </p:cNvPr>
@@ -508,7 +505,7 @@
           <a:bodyPr/>
           <a:lstStyle/>
           <a:p>
-            <a:fld id="{C70D2932-F217-BB46-82F8-7E28C131F1E5}" type="slidenum">
+            <a:fld id="{DD114690-6977-EC47-97D1-6B6592B53DC2}" type="slidenum">
               <a:rPr lang="en-GB" smtClean="0"/>
               <a:t>‹#›</a:t>
             </a:fld>
@@ -519,7 +516,7 @@
     </p:spTree>
     <p:extLst>
       <p:ext uri="{BB962C8B-B14F-4D97-AF65-F5344CB8AC3E}">
-        <p14:creationId xmlns:p14="http://schemas.microsoft.com/office/powerpoint/2010/main" val="1001179529"/>
+        <p14:creationId xmlns:p14="http://schemas.microsoft.com/office/powerpoint/2010/main" val="3077578681"/>
       </p:ext>
     </p:extLst>
   </p:cSld>
@@ -551,7 +548,7 @@
           <p:cNvPr id="2" name="Vertical Title 1">
             <a:extLst>
               <a:ext uri="{FF2B5EF4-FFF2-40B4-BE49-F238E27FC236}">
-                <a16:creationId xmlns:a16="http://schemas.microsoft.com/office/drawing/2014/main" id="{0E8E8F0D-201F-A141-9043-B54982FE8786}"/>
+                <a16:creationId xmlns:a16="http://schemas.microsoft.com/office/drawing/2014/main" id="{D0C6B085-77E7-9244-B6C2-3007662F305F}"/>
               </a:ext>
             </a:extLst>
           </p:cNvPr>
@@ -573,10 +570,9 @@
           <a:lstStyle/>
           <a:p>
             <a:r>
-              <a:rPr lang="en-US"/>
+              <a:rPr lang="en-GB"/>
               <a:t>Click to edit Master title style</a:t>
             </a:r>
-            <a:endParaRPr lang="en-GB"/>
           </a:p>
         </p:txBody>
       </p:sp>
@@ -585,7 +581,7 @@
           <p:cNvPr id="3" name="Vertical Text Placeholder 2">
             <a:extLst>
               <a:ext uri="{FF2B5EF4-FFF2-40B4-BE49-F238E27FC236}">
-                <a16:creationId xmlns:a16="http://schemas.microsoft.com/office/drawing/2014/main" id="{C277DECD-FE80-6D40-9F56-863F96FEC527}"/>
+                <a16:creationId xmlns:a16="http://schemas.microsoft.com/office/drawing/2014/main" id="{91ABB81F-1127-1A4E-AB7F-5B87F948D25C}"/>
               </a:ext>
             </a:extLst>
           </p:cNvPr>
@@ -608,38 +604,37 @@
           <a:p>
             <a:pPr lvl="0"/>
             <a:r>
-              <a:rPr lang="en-US"/>
-              <a:t>Edit Master text styles</a:t>
+              <a:rPr lang="en-GB"/>
+              <a:t>Click to edit Master text styles</a:t>
             </a:r>
           </a:p>
           <a:p>
             <a:pPr lvl="1"/>
             <a:r>
-              <a:rPr lang="en-US"/>
+              <a:rPr lang="en-GB"/>
               <a:t>Second level</a:t>
             </a:r>
           </a:p>
           <a:p>
             <a:pPr lvl="2"/>
             <a:r>
-              <a:rPr lang="en-US"/>
+              <a:rPr lang="en-GB"/>
               <a:t>Third level</a:t>
             </a:r>
           </a:p>
           <a:p>
             <a:pPr lvl="3"/>
             <a:r>
-              <a:rPr lang="en-US"/>
+              <a:rPr lang="en-GB"/>
               <a:t>Fourth level</a:t>
             </a:r>
           </a:p>
           <a:p>
             <a:pPr lvl="4"/>
             <a:r>
-              <a:rPr lang="en-US"/>
+              <a:rPr lang="en-GB"/>
               <a:t>Fifth level</a:t>
             </a:r>
-            <a:endParaRPr lang="en-GB"/>
           </a:p>
         </p:txBody>
       </p:sp>
@@ -648,7 +643,7 @@
           <p:cNvPr id="4" name="Date Placeholder 3">
             <a:extLst>
               <a:ext uri="{FF2B5EF4-FFF2-40B4-BE49-F238E27FC236}">
-                <a16:creationId xmlns:a16="http://schemas.microsoft.com/office/drawing/2014/main" id="{F07CD9BF-A617-F042-AADF-6C7E5EBA0A65}"/>
+                <a16:creationId xmlns:a16="http://schemas.microsoft.com/office/drawing/2014/main" id="{1EB23428-198B-844A-A406-9ADC0B25626F}"/>
               </a:ext>
             </a:extLst>
           </p:cNvPr>
@@ -664,9 +659,9 @@
           <a:bodyPr/>
           <a:lstStyle/>
           <a:p>
-            <a:fld id="{E25444B6-4230-B54C-BC2D-71877B2314F6}" type="datetimeFigureOut">
+            <a:fld id="{7FE2F37E-95F5-5141-BD82-756E4C53E23E}" type="datetimeFigureOut">
               <a:rPr lang="en-GB" smtClean="0"/>
-              <a:t>04/06/2020</a:t>
+              <a:t>28/08/2020</a:t>
             </a:fld>
             <a:endParaRPr lang="en-GB"/>
           </a:p>
@@ -677,7 +672,7 @@
           <p:cNvPr id="5" name="Footer Placeholder 4">
             <a:extLst>
               <a:ext uri="{FF2B5EF4-FFF2-40B4-BE49-F238E27FC236}">
-                <a16:creationId xmlns:a16="http://schemas.microsoft.com/office/drawing/2014/main" id="{C9A92759-8C48-944A-BE7B-9A6B6493124F}"/>
+                <a16:creationId xmlns:a16="http://schemas.microsoft.com/office/drawing/2014/main" id="{95F5FCD1-ADDE-0C4E-ACBF-3026BF896F18}"/>
               </a:ext>
             </a:extLst>
           </p:cNvPr>
@@ -702,7 +697,7 @@
           <p:cNvPr id="6" name="Slide Number Placeholder 5">
             <a:extLst>
               <a:ext uri="{FF2B5EF4-FFF2-40B4-BE49-F238E27FC236}">
-                <a16:creationId xmlns:a16="http://schemas.microsoft.com/office/drawing/2014/main" id="{2FA82431-72F3-244B-8E3C-7917EED5C929}"/>
+                <a16:creationId xmlns:a16="http://schemas.microsoft.com/office/drawing/2014/main" id="{6A176785-C8CE-2E4E-AD33-E845FABA233F}"/>
               </a:ext>
             </a:extLst>
           </p:cNvPr>
@@ -718,7 +713,7 @@
           <a:bodyPr/>
           <a:lstStyle/>
           <a:p>
-            <a:fld id="{C70D2932-F217-BB46-82F8-7E28C131F1E5}" type="slidenum">
+            <a:fld id="{DD114690-6977-EC47-97D1-6B6592B53DC2}" type="slidenum">
               <a:rPr lang="en-GB" smtClean="0"/>
               <a:t>‹#›</a:t>
             </a:fld>
@@ -729,7 +724,7 @@
     </p:spTree>
     <p:extLst>
       <p:ext uri="{BB962C8B-B14F-4D97-AF65-F5344CB8AC3E}">
-        <p14:creationId xmlns:p14="http://schemas.microsoft.com/office/powerpoint/2010/main" val="2688248384"/>
+        <p14:creationId xmlns:p14="http://schemas.microsoft.com/office/powerpoint/2010/main" val="1872209388"/>
       </p:ext>
     </p:extLst>
   </p:cSld>
@@ -761,7 +756,7 @@
           <p:cNvPr id="2" name="Title 1">
             <a:extLst>
               <a:ext uri="{FF2B5EF4-FFF2-40B4-BE49-F238E27FC236}">
-                <a16:creationId xmlns:a16="http://schemas.microsoft.com/office/drawing/2014/main" id="{508BDD0E-F933-854D-8FFA-FEC1BA0FBCA9}"/>
+                <a16:creationId xmlns:a16="http://schemas.microsoft.com/office/drawing/2014/main" id="{E7C79468-0824-3C4D-8810-68878F7BF841}"/>
               </a:ext>
             </a:extLst>
           </p:cNvPr>
@@ -778,10 +773,9 @@
           <a:lstStyle/>
           <a:p>
             <a:r>
-              <a:rPr lang="en-US"/>
+              <a:rPr lang="en-GB"/>
               <a:t>Click to edit Master title style</a:t>
             </a:r>
-            <a:endParaRPr lang="en-GB"/>
           </a:p>
         </p:txBody>
       </p:sp>
@@ -790,7 +784,7 @@
           <p:cNvPr id="3" name="Content Placeholder 2">
             <a:extLst>
               <a:ext uri="{FF2B5EF4-FFF2-40B4-BE49-F238E27FC236}">
-                <a16:creationId xmlns:a16="http://schemas.microsoft.com/office/drawing/2014/main" id="{9347BB89-944C-EF42-B5CA-7F764F3E65C9}"/>
+                <a16:creationId xmlns:a16="http://schemas.microsoft.com/office/drawing/2014/main" id="{18F0BCD0-AF24-804D-84B2-FBDEDDBAE1B5}"/>
               </a:ext>
             </a:extLst>
           </p:cNvPr>
@@ -808,38 +802,37 @@
           <a:p>
             <a:pPr lvl="0"/>
             <a:r>
-              <a:rPr lang="en-US"/>
-              <a:t>Edit Master text styles</a:t>
+              <a:rPr lang="en-GB"/>
+              <a:t>Click to edit Master text styles</a:t>
             </a:r>
           </a:p>
           <a:p>
             <a:pPr lvl="1"/>
             <a:r>
-              <a:rPr lang="en-US"/>
+              <a:rPr lang="en-GB"/>
               <a:t>Second level</a:t>
             </a:r>
           </a:p>
           <a:p>
             <a:pPr lvl="2"/>
             <a:r>
-              <a:rPr lang="en-US"/>
+              <a:rPr lang="en-GB"/>
               <a:t>Third level</a:t>
             </a:r>
           </a:p>
           <a:p>
             <a:pPr lvl="3"/>
             <a:r>
-              <a:rPr lang="en-US"/>
+              <a:rPr lang="en-GB"/>
               <a:t>Fourth level</a:t>
             </a:r>
           </a:p>
           <a:p>
             <a:pPr lvl="4"/>
             <a:r>
-              <a:rPr lang="en-US"/>
+              <a:rPr lang="en-GB"/>
               <a:t>Fifth level</a:t>
             </a:r>
-            <a:endParaRPr lang="en-GB"/>
           </a:p>
         </p:txBody>
       </p:sp>
@@ -848,7 +841,7 @@
           <p:cNvPr id="4" name="Date Placeholder 3">
             <a:extLst>
               <a:ext uri="{FF2B5EF4-FFF2-40B4-BE49-F238E27FC236}">
-                <a16:creationId xmlns:a16="http://schemas.microsoft.com/office/drawing/2014/main" id="{2E67DE58-F0AC-544C-A164-2CE3177269C9}"/>
+                <a16:creationId xmlns:a16="http://schemas.microsoft.com/office/drawing/2014/main" id="{4AE3AB8F-8909-2A41-B7C2-A715C5334064}"/>
               </a:ext>
             </a:extLst>
           </p:cNvPr>
@@ -864,9 +857,9 @@
           <a:bodyPr/>
           <a:lstStyle/>
           <a:p>
-            <a:fld id="{E25444B6-4230-B54C-BC2D-71877B2314F6}" type="datetimeFigureOut">
+            <a:fld id="{7FE2F37E-95F5-5141-BD82-756E4C53E23E}" type="datetimeFigureOut">
               <a:rPr lang="en-GB" smtClean="0"/>
-              <a:t>04/06/2020</a:t>
+              <a:t>28/08/2020</a:t>
             </a:fld>
             <a:endParaRPr lang="en-GB"/>
           </a:p>
@@ -877,7 +870,7 @@
           <p:cNvPr id="5" name="Footer Placeholder 4">
             <a:extLst>
               <a:ext uri="{FF2B5EF4-FFF2-40B4-BE49-F238E27FC236}">
-                <a16:creationId xmlns:a16="http://schemas.microsoft.com/office/drawing/2014/main" id="{48819258-BE3D-984E-899F-A50408829DE2}"/>
+                <a16:creationId xmlns:a16="http://schemas.microsoft.com/office/drawing/2014/main" id="{991B5A1F-8925-9744-938F-986EA0B91373}"/>
               </a:ext>
             </a:extLst>
           </p:cNvPr>
@@ -902,7 +895,7 @@
           <p:cNvPr id="6" name="Slide Number Placeholder 5">
             <a:extLst>
               <a:ext uri="{FF2B5EF4-FFF2-40B4-BE49-F238E27FC236}">
-                <a16:creationId xmlns:a16="http://schemas.microsoft.com/office/drawing/2014/main" id="{DD0C0464-848A-CF4C-8A8C-AA5DDF4B1DF8}"/>
+                <a16:creationId xmlns:a16="http://schemas.microsoft.com/office/drawing/2014/main" id="{8BA23500-9305-714B-884C-F52279B478AD}"/>
               </a:ext>
             </a:extLst>
           </p:cNvPr>
@@ -918,7 +911,7 @@
           <a:bodyPr/>
           <a:lstStyle/>
           <a:p>
-            <a:fld id="{C70D2932-F217-BB46-82F8-7E28C131F1E5}" type="slidenum">
+            <a:fld id="{DD114690-6977-EC47-97D1-6B6592B53DC2}" type="slidenum">
               <a:rPr lang="en-GB" smtClean="0"/>
               <a:t>‹#›</a:t>
             </a:fld>
@@ -929,7 +922,7 @@
     </p:spTree>
     <p:extLst>
       <p:ext uri="{BB962C8B-B14F-4D97-AF65-F5344CB8AC3E}">
-        <p14:creationId xmlns:p14="http://schemas.microsoft.com/office/powerpoint/2010/main" val="3970633456"/>
+        <p14:creationId xmlns:p14="http://schemas.microsoft.com/office/powerpoint/2010/main" val="112821534"/>
       </p:ext>
     </p:extLst>
   </p:cSld>
@@ -961,7 +954,7 @@
           <p:cNvPr id="2" name="Title 1">
             <a:extLst>
               <a:ext uri="{FF2B5EF4-FFF2-40B4-BE49-F238E27FC236}">
-                <a16:creationId xmlns:a16="http://schemas.microsoft.com/office/drawing/2014/main" id="{F9695C9F-135B-4742-A564-C4C46D581886}"/>
+                <a16:creationId xmlns:a16="http://schemas.microsoft.com/office/drawing/2014/main" id="{189406E4-4FC0-7949-AA2E-9213139326B0}"/>
               </a:ext>
             </a:extLst>
           </p:cNvPr>
@@ -987,10 +980,9 @@
           </a:lstStyle>
           <a:p>
             <a:r>
-              <a:rPr lang="en-US"/>
+              <a:rPr lang="en-GB"/>
               <a:t>Click to edit Master title style</a:t>
             </a:r>
-            <a:endParaRPr lang="en-GB"/>
           </a:p>
         </p:txBody>
       </p:sp>
@@ -999,7 +991,7 @@
           <p:cNvPr id="3" name="Text Placeholder 2">
             <a:extLst>
               <a:ext uri="{FF2B5EF4-FFF2-40B4-BE49-F238E27FC236}">
-                <a16:creationId xmlns:a16="http://schemas.microsoft.com/office/drawing/2014/main" id="{413F3BCE-ED45-B844-9FAB-010840B7EC37}"/>
+                <a16:creationId xmlns:a16="http://schemas.microsoft.com/office/drawing/2014/main" id="{F0262A68-8E1B-3147-8906-D3DAB08FD538}"/>
               </a:ext>
             </a:extLst>
           </p:cNvPr>
@@ -1113,8 +1105,8 @@
           <a:p>
             <a:pPr lvl="0"/>
             <a:r>
-              <a:rPr lang="en-US"/>
-              <a:t>Edit Master text styles</a:t>
+              <a:rPr lang="en-GB"/>
+              <a:t>Click to edit Master text styles</a:t>
             </a:r>
           </a:p>
         </p:txBody>
@@ -1124,7 +1116,7 @@
           <p:cNvPr id="4" name="Date Placeholder 3">
             <a:extLst>
               <a:ext uri="{FF2B5EF4-FFF2-40B4-BE49-F238E27FC236}">
-                <a16:creationId xmlns:a16="http://schemas.microsoft.com/office/drawing/2014/main" id="{D600542D-3B25-A944-B9CB-AFCF86A7E443}"/>
+                <a16:creationId xmlns:a16="http://schemas.microsoft.com/office/drawing/2014/main" id="{B714B4BC-42C0-C04A-B52D-A7082094C88C}"/>
               </a:ext>
             </a:extLst>
           </p:cNvPr>
@@ -1140,9 +1132,9 @@
           <a:bodyPr/>
           <a:lstStyle/>
           <a:p>
-            <a:fld id="{E25444B6-4230-B54C-BC2D-71877B2314F6}" type="datetimeFigureOut">
+            <a:fld id="{7FE2F37E-95F5-5141-BD82-756E4C53E23E}" type="datetimeFigureOut">
               <a:rPr lang="en-GB" smtClean="0"/>
-              <a:t>04/06/2020</a:t>
+              <a:t>28/08/2020</a:t>
             </a:fld>
             <a:endParaRPr lang="en-GB"/>
           </a:p>
@@ -1153,7 +1145,7 @@
           <p:cNvPr id="5" name="Footer Placeholder 4">
             <a:extLst>
               <a:ext uri="{FF2B5EF4-FFF2-40B4-BE49-F238E27FC236}">
-                <a16:creationId xmlns:a16="http://schemas.microsoft.com/office/drawing/2014/main" id="{BF3ED6DC-B0C9-A54C-8763-465DFAA24564}"/>
+                <a16:creationId xmlns:a16="http://schemas.microsoft.com/office/drawing/2014/main" id="{91583C13-3A4E-754F-AB8C-483CB1D14068}"/>
               </a:ext>
             </a:extLst>
           </p:cNvPr>
@@ -1178,7 +1170,7 @@
           <p:cNvPr id="6" name="Slide Number Placeholder 5">
             <a:extLst>
               <a:ext uri="{FF2B5EF4-FFF2-40B4-BE49-F238E27FC236}">
-                <a16:creationId xmlns:a16="http://schemas.microsoft.com/office/drawing/2014/main" id="{9BAB7248-AD4D-394F-BB67-D30DFFF37A2D}"/>
+                <a16:creationId xmlns:a16="http://schemas.microsoft.com/office/drawing/2014/main" id="{A537731E-618D-A844-93E9-BE9206BA0925}"/>
               </a:ext>
             </a:extLst>
           </p:cNvPr>
@@ -1194,7 +1186,7 @@
           <a:bodyPr/>
           <a:lstStyle/>
           <a:p>
-            <a:fld id="{C70D2932-F217-BB46-82F8-7E28C131F1E5}" type="slidenum">
+            <a:fld id="{DD114690-6977-EC47-97D1-6B6592B53DC2}" type="slidenum">
               <a:rPr lang="en-GB" smtClean="0"/>
               <a:t>‹#›</a:t>
             </a:fld>
@@ -1205,7 +1197,7 @@
     </p:spTree>
     <p:extLst>
       <p:ext uri="{BB962C8B-B14F-4D97-AF65-F5344CB8AC3E}">
-        <p14:creationId xmlns:p14="http://schemas.microsoft.com/office/powerpoint/2010/main" val="544059057"/>
+        <p14:creationId xmlns:p14="http://schemas.microsoft.com/office/powerpoint/2010/main" val="1171739518"/>
       </p:ext>
     </p:extLst>
   </p:cSld>
@@ -1237,7 +1229,7 @@
           <p:cNvPr id="2" name="Title 1">
             <a:extLst>
               <a:ext uri="{FF2B5EF4-FFF2-40B4-BE49-F238E27FC236}">
-                <a16:creationId xmlns:a16="http://schemas.microsoft.com/office/drawing/2014/main" id="{867263C5-8B00-DE49-B630-5B9B0C3C8980}"/>
+                <a16:creationId xmlns:a16="http://schemas.microsoft.com/office/drawing/2014/main" id="{41999F68-0696-6144-A72B-E7D51A2E5E50}"/>
               </a:ext>
             </a:extLst>
           </p:cNvPr>
@@ -1254,10 +1246,9 @@
           <a:lstStyle/>
           <a:p>
             <a:r>
-              <a:rPr lang="en-US"/>
+              <a:rPr lang="en-GB"/>
               <a:t>Click to edit Master title style</a:t>
             </a:r>
-            <a:endParaRPr lang="en-GB"/>
           </a:p>
         </p:txBody>
       </p:sp>
@@ -1266,7 +1257,7 @@
           <p:cNvPr id="3" name="Content Placeholder 2">
             <a:extLst>
               <a:ext uri="{FF2B5EF4-FFF2-40B4-BE49-F238E27FC236}">
-                <a16:creationId xmlns:a16="http://schemas.microsoft.com/office/drawing/2014/main" id="{2D454C2A-AB8F-9243-A9E3-03EDA2A22B3B}"/>
+                <a16:creationId xmlns:a16="http://schemas.microsoft.com/office/drawing/2014/main" id="{A66B904E-9510-9B46-A447-B0C9465D547C}"/>
               </a:ext>
             </a:extLst>
           </p:cNvPr>
@@ -1289,38 +1280,37 @@
           <a:p>
             <a:pPr lvl="0"/>
             <a:r>
-              <a:rPr lang="en-US"/>
-              <a:t>Edit Master text styles</a:t>
+              <a:rPr lang="en-GB"/>
+              <a:t>Click to edit Master text styles</a:t>
             </a:r>
           </a:p>
           <a:p>
             <a:pPr lvl="1"/>
             <a:r>
-              <a:rPr lang="en-US"/>
+              <a:rPr lang="en-GB"/>
               <a:t>Second level</a:t>
             </a:r>
           </a:p>
           <a:p>
             <a:pPr lvl="2"/>
             <a:r>
-              <a:rPr lang="en-US"/>
+              <a:rPr lang="en-GB"/>
               <a:t>Third level</a:t>
             </a:r>
           </a:p>
           <a:p>
             <a:pPr lvl="3"/>
             <a:r>
-              <a:rPr lang="en-US"/>
+              <a:rPr lang="en-GB"/>
               <a:t>Fourth level</a:t>
             </a:r>
           </a:p>
           <a:p>
             <a:pPr lvl="4"/>
             <a:r>
-              <a:rPr lang="en-US"/>
+              <a:rPr lang="en-GB"/>
               <a:t>Fifth level</a:t>
             </a:r>
-            <a:endParaRPr lang="en-GB"/>
           </a:p>
         </p:txBody>
       </p:sp>
@@ -1329,7 +1319,7 @@
           <p:cNvPr id="4" name="Content Placeholder 3">
             <a:extLst>
               <a:ext uri="{FF2B5EF4-FFF2-40B4-BE49-F238E27FC236}">
-                <a16:creationId xmlns:a16="http://schemas.microsoft.com/office/drawing/2014/main" id="{5C14CA70-D04B-E640-AE71-E7FE961309C9}"/>
+                <a16:creationId xmlns:a16="http://schemas.microsoft.com/office/drawing/2014/main" id="{413ACADE-2294-414A-8845-44D368CA59EE}"/>
               </a:ext>
             </a:extLst>
           </p:cNvPr>
@@ -1352,38 +1342,37 @@
           <a:p>
             <a:pPr lvl="0"/>
             <a:r>
-              <a:rPr lang="en-US"/>
-              <a:t>Edit Master text styles</a:t>
+              <a:rPr lang="en-GB"/>
+              <a:t>Click to edit Master text styles</a:t>
             </a:r>
           </a:p>
           <a:p>
             <a:pPr lvl="1"/>
             <a:r>
-              <a:rPr lang="en-US"/>
+              <a:rPr lang="en-GB"/>
               <a:t>Second level</a:t>
             </a:r>
           </a:p>
           <a:p>
             <a:pPr lvl="2"/>
             <a:r>
-              <a:rPr lang="en-US"/>
+              <a:rPr lang="en-GB"/>
               <a:t>Third level</a:t>
             </a:r>
           </a:p>
           <a:p>
             <a:pPr lvl="3"/>
             <a:r>
-              <a:rPr lang="en-US"/>
+              <a:rPr lang="en-GB"/>
               <a:t>Fourth level</a:t>
             </a:r>
           </a:p>
           <a:p>
             <a:pPr lvl="4"/>
             <a:r>
-              <a:rPr lang="en-US"/>
+              <a:rPr lang="en-GB"/>
               <a:t>Fifth level</a:t>
             </a:r>
-            <a:endParaRPr lang="en-GB"/>
           </a:p>
         </p:txBody>
       </p:sp>
@@ -1392,7 +1381,7 @@
           <p:cNvPr id="5" name="Date Placeholder 4">
             <a:extLst>
               <a:ext uri="{FF2B5EF4-FFF2-40B4-BE49-F238E27FC236}">
-                <a16:creationId xmlns:a16="http://schemas.microsoft.com/office/drawing/2014/main" id="{9C9C7237-5637-9B4F-A94A-7CF36EC30DA2}"/>
+                <a16:creationId xmlns:a16="http://schemas.microsoft.com/office/drawing/2014/main" id="{655218D0-0D6B-9F49-89F4-99F541D82B18}"/>
               </a:ext>
             </a:extLst>
           </p:cNvPr>
@@ -1408,9 +1397,9 @@
           <a:bodyPr/>
           <a:lstStyle/>
           <a:p>
-            <a:fld id="{E25444B6-4230-B54C-BC2D-71877B2314F6}" type="datetimeFigureOut">
+            <a:fld id="{7FE2F37E-95F5-5141-BD82-756E4C53E23E}" type="datetimeFigureOut">
               <a:rPr lang="en-GB" smtClean="0"/>
-              <a:t>04/06/2020</a:t>
+              <a:t>28/08/2020</a:t>
             </a:fld>
             <a:endParaRPr lang="en-GB"/>
           </a:p>
@@ -1421,7 +1410,7 @@
           <p:cNvPr id="6" name="Footer Placeholder 5">
             <a:extLst>
               <a:ext uri="{FF2B5EF4-FFF2-40B4-BE49-F238E27FC236}">
-                <a16:creationId xmlns:a16="http://schemas.microsoft.com/office/drawing/2014/main" id="{4C092472-1977-5740-930B-C09B8C0960EF}"/>
+                <a16:creationId xmlns:a16="http://schemas.microsoft.com/office/drawing/2014/main" id="{D92C3FC3-DBED-974F-83E7-80032CED87EA}"/>
               </a:ext>
             </a:extLst>
           </p:cNvPr>
@@ -1446,7 +1435,7 @@
           <p:cNvPr id="7" name="Slide Number Placeholder 6">
             <a:extLst>
               <a:ext uri="{FF2B5EF4-FFF2-40B4-BE49-F238E27FC236}">
-                <a16:creationId xmlns:a16="http://schemas.microsoft.com/office/drawing/2014/main" id="{6517FD07-F809-7541-8AAB-BD41E299DCC9}"/>
+                <a16:creationId xmlns:a16="http://schemas.microsoft.com/office/drawing/2014/main" id="{418C05EE-1844-4A4E-A629-B79F46A270CA}"/>
               </a:ext>
             </a:extLst>
           </p:cNvPr>
@@ -1462,7 +1451,7 @@
           <a:bodyPr/>
           <a:lstStyle/>
           <a:p>
-            <a:fld id="{C70D2932-F217-BB46-82F8-7E28C131F1E5}" type="slidenum">
+            <a:fld id="{DD114690-6977-EC47-97D1-6B6592B53DC2}" type="slidenum">
               <a:rPr lang="en-GB" smtClean="0"/>
               <a:t>‹#›</a:t>
             </a:fld>
@@ -1473,7 +1462,7 @@
     </p:spTree>
     <p:extLst>
       <p:ext uri="{BB962C8B-B14F-4D97-AF65-F5344CB8AC3E}">
-        <p14:creationId xmlns:p14="http://schemas.microsoft.com/office/powerpoint/2010/main" val="3069168089"/>
+        <p14:creationId xmlns:p14="http://schemas.microsoft.com/office/powerpoint/2010/main" val="3640324693"/>
       </p:ext>
     </p:extLst>
   </p:cSld>
@@ -1505,7 +1494,7 @@
           <p:cNvPr id="2" name="Title 1">
             <a:extLst>
               <a:ext uri="{FF2B5EF4-FFF2-40B4-BE49-F238E27FC236}">
-                <a16:creationId xmlns:a16="http://schemas.microsoft.com/office/drawing/2014/main" id="{948A7545-4060-A942-BA18-F5D979E99816}"/>
+                <a16:creationId xmlns:a16="http://schemas.microsoft.com/office/drawing/2014/main" id="{DD2DE127-F7C1-474F-A16A-03FD7F667C3A}"/>
               </a:ext>
             </a:extLst>
           </p:cNvPr>
@@ -1527,10 +1516,9 @@
           <a:lstStyle/>
           <a:p>
             <a:r>
-              <a:rPr lang="en-US"/>
+              <a:rPr lang="en-GB"/>
               <a:t>Click to edit Master title style</a:t>
             </a:r>
-            <a:endParaRPr lang="en-GB"/>
           </a:p>
         </p:txBody>
       </p:sp>
@@ -1539,7 +1527,7 @@
           <p:cNvPr id="3" name="Text Placeholder 2">
             <a:extLst>
               <a:ext uri="{FF2B5EF4-FFF2-40B4-BE49-F238E27FC236}">
-                <a16:creationId xmlns:a16="http://schemas.microsoft.com/office/drawing/2014/main" id="{9C1CD175-06A7-4E48-8429-D10F0EC15E73}"/>
+                <a16:creationId xmlns:a16="http://schemas.microsoft.com/office/drawing/2014/main" id="{B8DBC66D-67E8-9644-8444-E170ED3B49C9}"/>
               </a:ext>
             </a:extLst>
           </p:cNvPr>
@@ -1599,8 +1587,8 @@
           <a:p>
             <a:pPr lvl="0"/>
             <a:r>
-              <a:rPr lang="en-US"/>
-              <a:t>Edit Master text styles</a:t>
+              <a:rPr lang="en-GB"/>
+              <a:t>Click to edit Master text styles</a:t>
             </a:r>
           </a:p>
         </p:txBody>
@@ -1610,7 +1598,7 @@
           <p:cNvPr id="4" name="Content Placeholder 3">
             <a:extLst>
               <a:ext uri="{FF2B5EF4-FFF2-40B4-BE49-F238E27FC236}">
-                <a16:creationId xmlns:a16="http://schemas.microsoft.com/office/drawing/2014/main" id="{559C0B2D-F163-2740-A621-8ECC0751C853}"/>
+                <a16:creationId xmlns:a16="http://schemas.microsoft.com/office/drawing/2014/main" id="{096C4C80-0C5F-A546-A850-3448CB2862EC}"/>
               </a:ext>
             </a:extLst>
           </p:cNvPr>
@@ -1633,38 +1621,37 @@
           <a:p>
             <a:pPr lvl="0"/>
             <a:r>
-              <a:rPr lang="en-US"/>
-              <a:t>Edit Master text styles</a:t>
+              <a:rPr lang="en-GB"/>
+              <a:t>Click to edit Master text styles</a:t>
             </a:r>
           </a:p>
           <a:p>
             <a:pPr lvl="1"/>
             <a:r>
-              <a:rPr lang="en-US"/>
+              <a:rPr lang="en-GB"/>
               <a:t>Second level</a:t>
             </a:r>
           </a:p>
           <a:p>
             <a:pPr lvl="2"/>
             <a:r>
-              <a:rPr lang="en-US"/>
+              <a:rPr lang="en-GB"/>
               <a:t>Third level</a:t>
             </a:r>
           </a:p>
           <a:p>
             <a:pPr lvl="3"/>
             <a:r>
-              <a:rPr lang="en-US"/>
+              <a:rPr lang="en-GB"/>
               <a:t>Fourth level</a:t>
             </a:r>
           </a:p>
           <a:p>
             <a:pPr lvl="4"/>
             <a:r>
-              <a:rPr lang="en-US"/>
+              <a:rPr lang="en-GB"/>
               <a:t>Fifth level</a:t>
             </a:r>
-            <a:endParaRPr lang="en-GB"/>
           </a:p>
         </p:txBody>
       </p:sp>
@@ -1673,7 +1660,7 @@
           <p:cNvPr id="5" name="Text Placeholder 4">
             <a:extLst>
               <a:ext uri="{FF2B5EF4-FFF2-40B4-BE49-F238E27FC236}">
-                <a16:creationId xmlns:a16="http://schemas.microsoft.com/office/drawing/2014/main" id="{1CBF394E-DFA3-9340-AC56-19DA5B13B140}"/>
+                <a16:creationId xmlns:a16="http://schemas.microsoft.com/office/drawing/2014/main" id="{DC978136-0A44-DC49-B339-AE47A8A852C8}"/>
               </a:ext>
             </a:extLst>
           </p:cNvPr>
@@ -1733,8 +1720,8 @@
           <a:p>
             <a:pPr lvl="0"/>
             <a:r>
-              <a:rPr lang="en-US"/>
-              <a:t>Edit Master text styles</a:t>
+              <a:rPr lang="en-GB"/>
+              <a:t>Click to edit Master text styles</a:t>
             </a:r>
           </a:p>
         </p:txBody>
@@ -1744,7 +1731,7 @@
           <p:cNvPr id="6" name="Content Placeholder 5">
             <a:extLst>
               <a:ext uri="{FF2B5EF4-FFF2-40B4-BE49-F238E27FC236}">
-                <a16:creationId xmlns:a16="http://schemas.microsoft.com/office/drawing/2014/main" id="{C1FC0EA7-30B6-8C4C-9363-CD84BAA8B719}"/>
+                <a16:creationId xmlns:a16="http://schemas.microsoft.com/office/drawing/2014/main" id="{D4F2EB6D-44B2-8C4E-82B8-517486037AAD}"/>
               </a:ext>
             </a:extLst>
           </p:cNvPr>
@@ -1767,38 +1754,37 @@
           <a:p>
             <a:pPr lvl="0"/>
             <a:r>
-              <a:rPr lang="en-US"/>
-              <a:t>Edit Master text styles</a:t>
+              <a:rPr lang="en-GB"/>
+              <a:t>Click to edit Master text styles</a:t>
             </a:r>
           </a:p>
           <a:p>
             <a:pPr lvl="1"/>
             <a:r>
-              <a:rPr lang="en-US"/>
+              <a:rPr lang="en-GB"/>
               <a:t>Second level</a:t>
             </a:r>
           </a:p>
           <a:p>
             <a:pPr lvl="2"/>
             <a:r>
-              <a:rPr lang="en-US"/>
+              <a:rPr lang="en-GB"/>
               <a:t>Third level</a:t>
             </a:r>
           </a:p>
           <a:p>
             <a:pPr lvl="3"/>
             <a:r>
-              <a:rPr lang="en-US"/>
+              <a:rPr lang="en-GB"/>
               <a:t>Fourth level</a:t>
             </a:r>
           </a:p>
           <a:p>
             <a:pPr lvl="4"/>
             <a:r>
-              <a:rPr lang="en-US"/>
+              <a:rPr lang="en-GB"/>
               <a:t>Fifth level</a:t>
             </a:r>
-            <a:endParaRPr lang="en-GB"/>
           </a:p>
         </p:txBody>
       </p:sp>
@@ -1807,7 +1793,7 @@
           <p:cNvPr id="7" name="Date Placeholder 6">
             <a:extLst>
               <a:ext uri="{FF2B5EF4-FFF2-40B4-BE49-F238E27FC236}">
-                <a16:creationId xmlns:a16="http://schemas.microsoft.com/office/drawing/2014/main" id="{5C438AA5-4768-2B4C-BD2B-4FDA5DB3DE9E}"/>
+                <a16:creationId xmlns:a16="http://schemas.microsoft.com/office/drawing/2014/main" id="{F8612117-1B48-F54A-8BD1-D9DC02DB0BE7}"/>
               </a:ext>
             </a:extLst>
           </p:cNvPr>
@@ -1823,9 +1809,9 @@
           <a:bodyPr/>
           <a:lstStyle/>
           <a:p>
-            <a:fld id="{E25444B6-4230-B54C-BC2D-71877B2314F6}" type="datetimeFigureOut">
+            <a:fld id="{7FE2F37E-95F5-5141-BD82-756E4C53E23E}" type="datetimeFigureOut">
               <a:rPr lang="en-GB" smtClean="0"/>
-              <a:t>04/06/2020</a:t>
+              <a:t>28/08/2020</a:t>
             </a:fld>
             <a:endParaRPr lang="en-GB"/>
           </a:p>
@@ -1836,7 +1822,7 @@
           <p:cNvPr id="8" name="Footer Placeholder 7">
             <a:extLst>
               <a:ext uri="{FF2B5EF4-FFF2-40B4-BE49-F238E27FC236}">
-                <a16:creationId xmlns:a16="http://schemas.microsoft.com/office/drawing/2014/main" id="{9E6D101B-3156-524E-B929-29C86135EC7D}"/>
+                <a16:creationId xmlns:a16="http://schemas.microsoft.com/office/drawing/2014/main" id="{7C07A167-AFE5-D142-93D3-5E4706B9BC13}"/>
               </a:ext>
             </a:extLst>
           </p:cNvPr>
@@ -1861,7 +1847,7 @@
           <p:cNvPr id="9" name="Slide Number Placeholder 8">
             <a:extLst>
               <a:ext uri="{FF2B5EF4-FFF2-40B4-BE49-F238E27FC236}">
-                <a16:creationId xmlns:a16="http://schemas.microsoft.com/office/drawing/2014/main" id="{9BF72C0C-36EA-8541-A9C9-BA479C7FA216}"/>
+                <a16:creationId xmlns:a16="http://schemas.microsoft.com/office/drawing/2014/main" id="{CD51D7A8-753A-9B47-B4D2-B11A4A3AF606}"/>
               </a:ext>
             </a:extLst>
           </p:cNvPr>
@@ -1877,7 +1863,7 @@
           <a:bodyPr/>
           <a:lstStyle/>
           <a:p>
-            <a:fld id="{C70D2932-F217-BB46-82F8-7E28C131F1E5}" type="slidenum">
+            <a:fld id="{DD114690-6977-EC47-97D1-6B6592B53DC2}" type="slidenum">
               <a:rPr lang="en-GB" smtClean="0"/>
               <a:t>‹#›</a:t>
             </a:fld>
@@ -1888,7 +1874,7 @@
     </p:spTree>
     <p:extLst>
       <p:ext uri="{BB962C8B-B14F-4D97-AF65-F5344CB8AC3E}">
-        <p14:creationId xmlns:p14="http://schemas.microsoft.com/office/powerpoint/2010/main" val="2741573430"/>
+        <p14:creationId xmlns:p14="http://schemas.microsoft.com/office/powerpoint/2010/main" val="897835140"/>
       </p:ext>
     </p:extLst>
   </p:cSld>
@@ -1920,7 +1906,7 @@
           <p:cNvPr id="2" name="Title 1">
             <a:extLst>
               <a:ext uri="{FF2B5EF4-FFF2-40B4-BE49-F238E27FC236}">
-                <a16:creationId xmlns:a16="http://schemas.microsoft.com/office/drawing/2014/main" id="{107F7B68-CBE2-C64E-A13A-F822953BCFDE}"/>
+                <a16:creationId xmlns:a16="http://schemas.microsoft.com/office/drawing/2014/main" id="{8795A7AF-8AFE-3F49-AD0A-106EB0DE084B}"/>
               </a:ext>
             </a:extLst>
           </p:cNvPr>
@@ -1937,10 +1923,9 @@
           <a:lstStyle/>
           <a:p>
             <a:r>
-              <a:rPr lang="en-US"/>
+              <a:rPr lang="en-GB"/>
               <a:t>Click to edit Master title style</a:t>
             </a:r>
-            <a:endParaRPr lang="en-GB"/>
           </a:p>
         </p:txBody>
       </p:sp>
@@ -1949,7 +1934,7 @@
           <p:cNvPr id="3" name="Date Placeholder 2">
             <a:extLst>
               <a:ext uri="{FF2B5EF4-FFF2-40B4-BE49-F238E27FC236}">
-                <a16:creationId xmlns:a16="http://schemas.microsoft.com/office/drawing/2014/main" id="{5C205A33-D167-4240-9F51-AC30DC1319CC}"/>
+                <a16:creationId xmlns:a16="http://schemas.microsoft.com/office/drawing/2014/main" id="{E9672675-5E5F-EA4E-9DA7-D6403305BD47}"/>
               </a:ext>
             </a:extLst>
           </p:cNvPr>
@@ -1965,9 +1950,9 @@
           <a:bodyPr/>
           <a:lstStyle/>
           <a:p>
-            <a:fld id="{E25444B6-4230-B54C-BC2D-71877B2314F6}" type="datetimeFigureOut">
+            <a:fld id="{7FE2F37E-95F5-5141-BD82-756E4C53E23E}" type="datetimeFigureOut">
               <a:rPr lang="en-GB" smtClean="0"/>
-              <a:t>04/06/2020</a:t>
+              <a:t>28/08/2020</a:t>
             </a:fld>
             <a:endParaRPr lang="en-GB"/>
           </a:p>
@@ -1978,7 +1963,7 @@
           <p:cNvPr id="4" name="Footer Placeholder 3">
             <a:extLst>
               <a:ext uri="{FF2B5EF4-FFF2-40B4-BE49-F238E27FC236}">
-                <a16:creationId xmlns:a16="http://schemas.microsoft.com/office/drawing/2014/main" id="{EC5A2D16-0AA8-3440-8BED-2F6A993E599F}"/>
+                <a16:creationId xmlns:a16="http://schemas.microsoft.com/office/drawing/2014/main" id="{4BBD6886-9B26-8B48-A03A-D72DB90D1463}"/>
               </a:ext>
             </a:extLst>
           </p:cNvPr>
@@ -2003,7 +1988,7 @@
           <p:cNvPr id="5" name="Slide Number Placeholder 4">
             <a:extLst>
               <a:ext uri="{FF2B5EF4-FFF2-40B4-BE49-F238E27FC236}">
-                <a16:creationId xmlns:a16="http://schemas.microsoft.com/office/drawing/2014/main" id="{6BF4B9EE-C09F-FB43-BBA9-0ADC79B3B893}"/>
+                <a16:creationId xmlns:a16="http://schemas.microsoft.com/office/drawing/2014/main" id="{B4B4852D-2A83-9546-BF90-0DB60A219774}"/>
               </a:ext>
             </a:extLst>
           </p:cNvPr>
@@ -2019,7 +2004,7 @@
           <a:bodyPr/>
           <a:lstStyle/>
           <a:p>
-            <a:fld id="{C70D2932-F217-BB46-82F8-7E28C131F1E5}" type="slidenum">
+            <a:fld id="{DD114690-6977-EC47-97D1-6B6592B53DC2}" type="slidenum">
               <a:rPr lang="en-GB" smtClean="0"/>
               <a:t>‹#›</a:t>
             </a:fld>
@@ -2030,7 +2015,7 @@
     </p:spTree>
     <p:extLst>
       <p:ext uri="{BB962C8B-B14F-4D97-AF65-F5344CB8AC3E}">
-        <p14:creationId xmlns:p14="http://schemas.microsoft.com/office/powerpoint/2010/main" val="272421747"/>
+        <p14:creationId xmlns:p14="http://schemas.microsoft.com/office/powerpoint/2010/main" val="2618989148"/>
       </p:ext>
     </p:extLst>
   </p:cSld>
@@ -2062,7 +2047,7 @@
           <p:cNvPr id="2" name="Date Placeholder 1">
             <a:extLst>
               <a:ext uri="{FF2B5EF4-FFF2-40B4-BE49-F238E27FC236}">
-                <a16:creationId xmlns:a16="http://schemas.microsoft.com/office/drawing/2014/main" id="{A634BC56-DB95-9B44-AB1D-110EA3C17D22}"/>
+                <a16:creationId xmlns:a16="http://schemas.microsoft.com/office/drawing/2014/main" id="{0EC0E7B3-B3E5-8B4F-9692-C2E618AA12FC}"/>
               </a:ext>
             </a:extLst>
           </p:cNvPr>
@@ -2078,9 +2063,9 @@
           <a:bodyPr/>
           <a:lstStyle/>
           <a:p>
-            <a:fld id="{E25444B6-4230-B54C-BC2D-71877B2314F6}" type="datetimeFigureOut">
+            <a:fld id="{7FE2F37E-95F5-5141-BD82-756E4C53E23E}" type="datetimeFigureOut">
               <a:rPr lang="en-GB" smtClean="0"/>
-              <a:t>04/06/2020</a:t>
+              <a:t>28/08/2020</a:t>
             </a:fld>
             <a:endParaRPr lang="en-GB"/>
           </a:p>
@@ -2091,7 +2076,7 @@
           <p:cNvPr id="3" name="Footer Placeholder 2">
             <a:extLst>
               <a:ext uri="{FF2B5EF4-FFF2-40B4-BE49-F238E27FC236}">
-                <a16:creationId xmlns:a16="http://schemas.microsoft.com/office/drawing/2014/main" id="{FC02553B-991B-2D4A-8792-C8B6FD60D056}"/>
+                <a16:creationId xmlns:a16="http://schemas.microsoft.com/office/drawing/2014/main" id="{8282034B-82DD-3140-AB8E-38CAFDE0D3DC}"/>
               </a:ext>
             </a:extLst>
           </p:cNvPr>
@@ -2116,7 +2101,7 @@
           <p:cNvPr id="4" name="Slide Number Placeholder 3">
             <a:extLst>
               <a:ext uri="{FF2B5EF4-FFF2-40B4-BE49-F238E27FC236}">
-                <a16:creationId xmlns:a16="http://schemas.microsoft.com/office/drawing/2014/main" id="{B4E59A6D-FE96-A94B-9083-6990618C9A73}"/>
+                <a16:creationId xmlns:a16="http://schemas.microsoft.com/office/drawing/2014/main" id="{B6ECA146-639A-D241-9EA3-3CFADD5499C2}"/>
               </a:ext>
             </a:extLst>
           </p:cNvPr>
@@ -2132,7 +2117,7 @@
           <a:bodyPr/>
           <a:lstStyle/>
           <a:p>
-            <a:fld id="{C70D2932-F217-BB46-82F8-7E28C131F1E5}" type="slidenum">
+            <a:fld id="{DD114690-6977-EC47-97D1-6B6592B53DC2}" type="slidenum">
               <a:rPr lang="en-GB" smtClean="0"/>
               <a:t>‹#›</a:t>
             </a:fld>
@@ -2143,7 +2128,7 @@
     </p:spTree>
     <p:extLst>
       <p:ext uri="{BB962C8B-B14F-4D97-AF65-F5344CB8AC3E}">
-        <p14:creationId xmlns:p14="http://schemas.microsoft.com/office/powerpoint/2010/main" val="1605100696"/>
+        <p14:creationId xmlns:p14="http://schemas.microsoft.com/office/powerpoint/2010/main" val="2685874657"/>
       </p:ext>
     </p:extLst>
   </p:cSld>
@@ -2175,7 +2160,7 @@
           <p:cNvPr id="2" name="Title 1">
             <a:extLst>
               <a:ext uri="{FF2B5EF4-FFF2-40B4-BE49-F238E27FC236}">
-                <a16:creationId xmlns:a16="http://schemas.microsoft.com/office/drawing/2014/main" id="{84CC6532-194C-EB4A-B16D-739648DF41F1}"/>
+                <a16:creationId xmlns:a16="http://schemas.microsoft.com/office/drawing/2014/main" id="{C6EBF18F-BAF2-E74F-8D1B-3F568B91EB00}"/>
               </a:ext>
             </a:extLst>
           </p:cNvPr>
@@ -2201,10 +2186,9 @@
           </a:lstStyle>
           <a:p>
             <a:r>
-              <a:rPr lang="en-US"/>
+              <a:rPr lang="en-GB"/>
               <a:t>Click to edit Master title style</a:t>
             </a:r>
-            <a:endParaRPr lang="en-GB"/>
           </a:p>
         </p:txBody>
       </p:sp>
@@ -2213,7 +2197,7 @@
           <p:cNvPr id="3" name="Content Placeholder 2">
             <a:extLst>
               <a:ext uri="{FF2B5EF4-FFF2-40B4-BE49-F238E27FC236}">
-                <a16:creationId xmlns:a16="http://schemas.microsoft.com/office/drawing/2014/main" id="{ED338B14-671C-E349-AA31-9324C31B7F4E}"/>
+                <a16:creationId xmlns:a16="http://schemas.microsoft.com/office/drawing/2014/main" id="{693462FF-E3B2-3444-81AC-0E85B475FD54}"/>
               </a:ext>
             </a:extLst>
           </p:cNvPr>
@@ -2264,38 +2248,37 @@
           <a:p>
             <a:pPr lvl="0"/>
             <a:r>
-              <a:rPr lang="en-US"/>
-              <a:t>Edit Master text styles</a:t>
+              <a:rPr lang="en-GB"/>
+              <a:t>Click to edit Master text styles</a:t>
             </a:r>
           </a:p>
           <a:p>
             <a:pPr lvl="1"/>
             <a:r>
-              <a:rPr lang="en-US"/>
+              <a:rPr lang="en-GB"/>
               <a:t>Second level</a:t>
             </a:r>
           </a:p>
           <a:p>
             <a:pPr lvl="2"/>
             <a:r>
-              <a:rPr lang="en-US"/>
+              <a:rPr lang="en-GB"/>
               <a:t>Third level</a:t>
             </a:r>
           </a:p>
           <a:p>
             <a:pPr lvl="3"/>
             <a:r>
-              <a:rPr lang="en-US"/>
+              <a:rPr lang="en-GB"/>
               <a:t>Fourth level</a:t>
             </a:r>
           </a:p>
           <a:p>
             <a:pPr lvl="4"/>
             <a:r>
-              <a:rPr lang="en-US"/>
+              <a:rPr lang="en-GB"/>
               <a:t>Fifth level</a:t>
             </a:r>
-            <a:endParaRPr lang="en-GB"/>
           </a:p>
         </p:txBody>
       </p:sp>
@@ -2304,7 +2287,7 @@
           <p:cNvPr id="4" name="Text Placeholder 3">
             <a:extLst>
               <a:ext uri="{FF2B5EF4-FFF2-40B4-BE49-F238E27FC236}">
-                <a16:creationId xmlns:a16="http://schemas.microsoft.com/office/drawing/2014/main" id="{021F86D9-00CE-2E45-BCA5-ECA7E6147E06}"/>
+                <a16:creationId xmlns:a16="http://schemas.microsoft.com/office/drawing/2014/main" id="{CE49762E-576A-E141-846A-454BB9EAC0F1}"/>
               </a:ext>
             </a:extLst>
           </p:cNvPr>
@@ -2364,8 +2347,8 @@
           <a:p>
             <a:pPr lvl="0"/>
             <a:r>
-              <a:rPr lang="en-US"/>
-              <a:t>Edit Master text styles</a:t>
+              <a:rPr lang="en-GB"/>
+              <a:t>Click to edit Master text styles</a:t>
             </a:r>
           </a:p>
         </p:txBody>
@@ -2375,7 +2358,7 @@
           <p:cNvPr id="5" name="Date Placeholder 4">
             <a:extLst>
               <a:ext uri="{FF2B5EF4-FFF2-40B4-BE49-F238E27FC236}">
-                <a16:creationId xmlns:a16="http://schemas.microsoft.com/office/drawing/2014/main" id="{AFEF42CB-5E0B-C74C-8D8E-61DD31CF1E75}"/>
+                <a16:creationId xmlns:a16="http://schemas.microsoft.com/office/drawing/2014/main" id="{B2EEDE2D-BD2A-2E44-AF73-E87F97C971E9}"/>
               </a:ext>
             </a:extLst>
           </p:cNvPr>
@@ -2391,9 +2374,9 @@
           <a:bodyPr/>
           <a:lstStyle/>
           <a:p>
-            <a:fld id="{E25444B6-4230-B54C-BC2D-71877B2314F6}" type="datetimeFigureOut">
+            <a:fld id="{7FE2F37E-95F5-5141-BD82-756E4C53E23E}" type="datetimeFigureOut">
               <a:rPr lang="en-GB" smtClean="0"/>
-              <a:t>04/06/2020</a:t>
+              <a:t>28/08/2020</a:t>
             </a:fld>
             <a:endParaRPr lang="en-GB"/>
           </a:p>
@@ -2404,7 +2387,7 @@
           <p:cNvPr id="6" name="Footer Placeholder 5">
             <a:extLst>
               <a:ext uri="{FF2B5EF4-FFF2-40B4-BE49-F238E27FC236}">
-                <a16:creationId xmlns:a16="http://schemas.microsoft.com/office/drawing/2014/main" id="{B2D11110-5777-4145-B70F-673685CC735A}"/>
+                <a16:creationId xmlns:a16="http://schemas.microsoft.com/office/drawing/2014/main" id="{9CFD9C42-77AD-DF48-B32F-A649742B52FE}"/>
               </a:ext>
             </a:extLst>
           </p:cNvPr>
@@ -2429,7 +2412,7 @@
           <p:cNvPr id="7" name="Slide Number Placeholder 6">
             <a:extLst>
               <a:ext uri="{FF2B5EF4-FFF2-40B4-BE49-F238E27FC236}">
-                <a16:creationId xmlns:a16="http://schemas.microsoft.com/office/drawing/2014/main" id="{22BE883E-E4A8-1D4B-9C9C-217DEBBC8A5C}"/>
+                <a16:creationId xmlns:a16="http://schemas.microsoft.com/office/drawing/2014/main" id="{58F0C086-2585-D84A-8B8C-107448F9EC61}"/>
               </a:ext>
             </a:extLst>
           </p:cNvPr>
@@ -2445,7 +2428,7 @@
           <a:bodyPr/>
           <a:lstStyle/>
           <a:p>
-            <a:fld id="{C70D2932-F217-BB46-82F8-7E28C131F1E5}" type="slidenum">
+            <a:fld id="{DD114690-6977-EC47-97D1-6B6592B53DC2}" type="slidenum">
               <a:rPr lang="en-GB" smtClean="0"/>
               <a:t>‹#›</a:t>
             </a:fld>
@@ -2456,7 +2439,7 @@
     </p:spTree>
     <p:extLst>
       <p:ext uri="{BB962C8B-B14F-4D97-AF65-F5344CB8AC3E}">
-        <p14:creationId xmlns:p14="http://schemas.microsoft.com/office/powerpoint/2010/main" val="3065805130"/>
+        <p14:creationId xmlns:p14="http://schemas.microsoft.com/office/powerpoint/2010/main" val="1259776321"/>
       </p:ext>
     </p:extLst>
   </p:cSld>
@@ -2488,7 +2471,7 @@
           <p:cNvPr id="2" name="Title 1">
             <a:extLst>
               <a:ext uri="{FF2B5EF4-FFF2-40B4-BE49-F238E27FC236}">
-                <a16:creationId xmlns:a16="http://schemas.microsoft.com/office/drawing/2014/main" id="{285B4455-4F28-014C-8839-31BAD837C376}"/>
+                <a16:creationId xmlns:a16="http://schemas.microsoft.com/office/drawing/2014/main" id="{52DBEF43-A657-384E-8768-628A0082FBD1}"/>
               </a:ext>
             </a:extLst>
           </p:cNvPr>
@@ -2514,10 +2497,9 @@
           </a:lstStyle>
           <a:p>
             <a:r>
-              <a:rPr lang="en-US"/>
+              <a:rPr lang="en-GB"/>
               <a:t>Click to edit Master title style</a:t>
             </a:r>
-            <a:endParaRPr lang="en-GB"/>
           </a:p>
         </p:txBody>
       </p:sp>
@@ -2526,7 +2508,7 @@
           <p:cNvPr id="3" name="Picture Placeholder 2">
             <a:extLst>
               <a:ext uri="{FF2B5EF4-FFF2-40B4-BE49-F238E27FC236}">
-                <a16:creationId xmlns:a16="http://schemas.microsoft.com/office/drawing/2014/main" id="{9A845622-244D-B549-9BD9-39C1A649414A}"/>
+                <a16:creationId xmlns:a16="http://schemas.microsoft.com/office/drawing/2014/main" id="{1F506A41-56DD-CD4C-9F58-05FD63C68047}"/>
               </a:ext>
             </a:extLst>
           </p:cNvPr>
@@ -2593,7 +2575,7 @@
           <p:cNvPr id="4" name="Text Placeholder 3">
             <a:extLst>
               <a:ext uri="{FF2B5EF4-FFF2-40B4-BE49-F238E27FC236}">
-                <a16:creationId xmlns:a16="http://schemas.microsoft.com/office/drawing/2014/main" id="{1C62393A-13FB-3D4E-9F0F-1ADA05BD1E43}"/>
+                <a16:creationId xmlns:a16="http://schemas.microsoft.com/office/drawing/2014/main" id="{BDE44799-FDD8-F849-BC6B-2B2853449560}"/>
               </a:ext>
             </a:extLst>
           </p:cNvPr>
@@ -2653,8 +2635,8 @@
           <a:p>
             <a:pPr lvl="0"/>
             <a:r>
-              <a:rPr lang="en-US"/>
-              <a:t>Edit Master text styles</a:t>
+              <a:rPr lang="en-GB"/>
+              <a:t>Click to edit Master text styles</a:t>
             </a:r>
           </a:p>
         </p:txBody>
@@ -2664,7 +2646,7 @@
           <p:cNvPr id="5" name="Date Placeholder 4">
             <a:extLst>
               <a:ext uri="{FF2B5EF4-FFF2-40B4-BE49-F238E27FC236}">
-                <a16:creationId xmlns:a16="http://schemas.microsoft.com/office/drawing/2014/main" id="{942A525F-A1AF-344A-9D4B-4BB33CA0713B}"/>
+                <a16:creationId xmlns:a16="http://schemas.microsoft.com/office/drawing/2014/main" id="{F4DFF230-9CFA-4746-A39F-5180DA9E04AF}"/>
               </a:ext>
             </a:extLst>
           </p:cNvPr>
@@ -2680,9 +2662,9 @@
           <a:bodyPr/>
           <a:lstStyle/>
           <a:p>
-            <a:fld id="{E25444B6-4230-B54C-BC2D-71877B2314F6}" type="datetimeFigureOut">
+            <a:fld id="{7FE2F37E-95F5-5141-BD82-756E4C53E23E}" type="datetimeFigureOut">
               <a:rPr lang="en-GB" smtClean="0"/>
-              <a:t>04/06/2020</a:t>
+              <a:t>28/08/2020</a:t>
             </a:fld>
             <a:endParaRPr lang="en-GB"/>
           </a:p>
@@ -2693,7 +2675,7 @@
           <p:cNvPr id="6" name="Footer Placeholder 5">
             <a:extLst>
               <a:ext uri="{FF2B5EF4-FFF2-40B4-BE49-F238E27FC236}">
-                <a16:creationId xmlns:a16="http://schemas.microsoft.com/office/drawing/2014/main" id="{46BEB269-3CD8-144B-B28C-E215BF6C5DB0}"/>
+                <a16:creationId xmlns:a16="http://schemas.microsoft.com/office/drawing/2014/main" id="{2F9A1DD9-1E53-AB42-B95A-5D5EC9D5AE5A}"/>
               </a:ext>
             </a:extLst>
           </p:cNvPr>
@@ -2718,7 +2700,7 @@
           <p:cNvPr id="7" name="Slide Number Placeholder 6">
             <a:extLst>
               <a:ext uri="{FF2B5EF4-FFF2-40B4-BE49-F238E27FC236}">
-                <a16:creationId xmlns:a16="http://schemas.microsoft.com/office/drawing/2014/main" id="{65D4B83F-9AA1-164B-B0D2-318B8D210C01}"/>
+                <a16:creationId xmlns:a16="http://schemas.microsoft.com/office/drawing/2014/main" id="{868F3D17-B388-6C44-B214-0A607258A415}"/>
               </a:ext>
             </a:extLst>
           </p:cNvPr>
@@ -2734,7 +2716,7 @@
           <a:bodyPr/>
           <a:lstStyle/>
           <a:p>
-            <a:fld id="{C70D2932-F217-BB46-82F8-7E28C131F1E5}" type="slidenum">
+            <a:fld id="{DD114690-6977-EC47-97D1-6B6592B53DC2}" type="slidenum">
               <a:rPr lang="en-GB" smtClean="0"/>
               <a:t>‹#›</a:t>
             </a:fld>
@@ -2745,7 +2727,7 @@
     </p:spTree>
     <p:extLst>
       <p:ext uri="{BB962C8B-B14F-4D97-AF65-F5344CB8AC3E}">
-        <p14:creationId xmlns:p14="http://schemas.microsoft.com/office/powerpoint/2010/main" val="986826338"/>
+        <p14:creationId xmlns:p14="http://schemas.microsoft.com/office/powerpoint/2010/main" val="2773275931"/>
       </p:ext>
     </p:extLst>
   </p:cSld>
@@ -2782,7 +2764,7 @@
           <p:cNvPr id="2" name="Title Placeholder 1">
             <a:extLst>
               <a:ext uri="{FF2B5EF4-FFF2-40B4-BE49-F238E27FC236}">
-                <a16:creationId xmlns:a16="http://schemas.microsoft.com/office/drawing/2014/main" id="{47D7885A-A862-8044-9FF9-A540BDC46B57}"/>
+                <a16:creationId xmlns:a16="http://schemas.microsoft.com/office/drawing/2014/main" id="{A1B1F01C-7DBA-DB43-8BA1-B2CFC97C247E}"/>
               </a:ext>
             </a:extLst>
           </p:cNvPr>
@@ -2809,10 +2791,9 @@
           <a:lstStyle/>
           <a:p>
             <a:r>
-              <a:rPr lang="en-US"/>
+              <a:rPr lang="en-GB"/>
               <a:t>Click to edit Master title style</a:t>
             </a:r>
-            <a:endParaRPr lang="en-GB"/>
           </a:p>
         </p:txBody>
       </p:sp>
@@ -2821,7 +2802,7 @@
           <p:cNvPr id="3" name="Text Placeholder 2">
             <a:extLst>
               <a:ext uri="{FF2B5EF4-FFF2-40B4-BE49-F238E27FC236}">
-                <a16:creationId xmlns:a16="http://schemas.microsoft.com/office/drawing/2014/main" id="{1C4838B2-201F-6D4D-AD7F-17C595BD6A1E}"/>
+                <a16:creationId xmlns:a16="http://schemas.microsoft.com/office/drawing/2014/main" id="{DF4EF3DE-33E4-6A44-A737-518BA1115D27}"/>
               </a:ext>
             </a:extLst>
           </p:cNvPr>
@@ -2849,38 +2830,37 @@
           <a:p>
             <a:pPr lvl="0"/>
             <a:r>
-              <a:rPr lang="en-US"/>
-              <a:t>Edit Master text styles</a:t>
+              <a:rPr lang="en-GB"/>
+              <a:t>Click to edit Master text styles</a:t>
             </a:r>
           </a:p>
           <a:p>
             <a:pPr lvl="1"/>
             <a:r>
-              <a:rPr lang="en-US"/>
+              <a:rPr lang="en-GB"/>
               <a:t>Second level</a:t>
             </a:r>
           </a:p>
           <a:p>
             <a:pPr lvl="2"/>
             <a:r>
-              <a:rPr lang="en-US"/>
+              <a:rPr lang="en-GB"/>
               <a:t>Third level</a:t>
             </a:r>
           </a:p>
           <a:p>
             <a:pPr lvl="3"/>
             <a:r>
-              <a:rPr lang="en-US"/>
+              <a:rPr lang="en-GB"/>
               <a:t>Fourth level</a:t>
             </a:r>
           </a:p>
           <a:p>
             <a:pPr lvl="4"/>
             <a:r>
-              <a:rPr lang="en-US"/>
+              <a:rPr lang="en-GB"/>
               <a:t>Fifth level</a:t>
             </a:r>
-            <a:endParaRPr lang="en-GB"/>
           </a:p>
         </p:txBody>
       </p:sp>
@@ -2889,7 +2869,7 @@
           <p:cNvPr id="4" name="Date Placeholder 3">
             <a:extLst>
               <a:ext uri="{FF2B5EF4-FFF2-40B4-BE49-F238E27FC236}">
-                <a16:creationId xmlns:a16="http://schemas.microsoft.com/office/drawing/2014/main" id="{9C9C2A5D-702B-3A40-AFB4-D7B26769CF5B}"/>
+                <a16:creationId xmlns:a16="http://schemas.microsoft.com/office/drawing/2014/main" id="{9AB1242C-F7B2-CE46-BC0D-839C597067D7}"/>
               </a:ext>
             </a:extLst>
           </p:cNvPr>
@@ -2923,9 +2903,9 @@
             </a:lvl1pPr>
           </a:lstStyle>
           <a:p>
-            <a:fld id="{E25444B6-4230-B54C-BC2D-71877B2314F6}" type="datetimeFigureOut">
+            <a:fld id="{7FE2F37E-95F5-5141-BD82-756E4C53E23E}" type="datetimeFigureOut">
               <a:rPr lang="en-GB" smtClean="0"/>
-              <a:t>04/06/2020</a:t>
+              <a:t>28/08/2020</a:t>
             </a:fld>
             <a:endParaRPr lang="en-GB"/>
           </a:p>
@@ -2936,7 +2916,7 @@
           <p:cNvPr id="5" name="Footer Placeholder 4">
             <a:extLst>
               <a:ext uri="{FF2B5EF4-FFF2-40B4-BE49-F238E27FC236}">
-                <a16:creationId xmlns:a16="http://schemas.microsoft.com/office/drawing/2014/main" id="{2CA583D9-8BAB-BB42-8FD9-E4CEB6022F65}"/>
+                <a16:creationId xmlns:a16="http://schemas.microsoft.com/office/drawing/2014/main" id="{B0C0ADCA-F249-4D48-B41B-315219BF6146}"/>
               </a:ext>
             </a:extLst>
           </p:cNvPr>
@@ -2979,7 +2959,7 @@
           <p:cNvPr id="6" name="Slide Number Placeholder 5">
             <a:extLst>
               <a:ext uri="{FF2B5EF4-FFF2-40B4-BE49-F238E27FC236}">
-                <a16:creationId xmlns:a16="http://schemas.microsoft.com/office/drawing/2014/main" id="{6DBB5A01-B51B-404E-A563-3710E74EC3AE}"/>
+                <a16:creationId xmlns:a16="http://schemas.microsoft.com/office/drawing/2014/main" id="{DCBD0622-37D3-474A-AA39-8D03C8DBBD2E}"/>
               </a:ext>
             </a:extLst>
           </p:cNvPr>
@@ -3013,7 +2993,7 @@
             </a:lvl1pPr>
           </a:lstStyle>
           <a:p>
-            <a:fld id="{C70D2932-F217-BB46-82F8-7E28C131F1E5}" type="slidenum">
+            <a:fld id="{DD114690-6977-EC47-97D1-6B6592B53DC2}" type="slidenum">
               <a:rPr lang="en-GB" smtClean="0"/>
               <a:t>‹#›</a:t>
             </a:fld>
@@ -3024,7 +3004,7 @@
     </p:spTree>
     <p:extLst>
       <p:ext uri="{BB962C8B-B14F-4D97-AF65-F5344CB8AC3E}">
-        <p14:creationId xmlns:p14="http://schemas.microsoft.com/office/powerpoint/2010/main" val="3845589374"/>
+        <p14:creationId xmlns:p14="http://schemas.microsoft.com/office/powerpoint/2010/main" val="3053178263"/>
       </p:ext>
     </p:extLst>
   </p:cSld>
@@ -3344,10 +3324,10 @@
       </p:grpSpPr>
       <p:pic>
         <p:nvPicPr>
-          <p:cNvPr id="5" name="Graphic 4">
-            <a:extLst>
-              <a:ext uri="{FF2B5EF4-FFF2-40B4-BE49-F238E27FC236}">
-                <a16:creationId xmlns:a16="http://schemas.microsoft.com/office/drawing/2014/main" id="{10C41C75-0381-954F-9FDC-2F3B4189BCC1}"/>
+          <p:cNvPr id="3" name="Picture 2">
+            <a:extLst>
+              <a:ext uri="{FF2B5EF4-FFF2-40B4-BE49-F238E27FC236}">
+                <a16:creationId xmlns:a16="http://schemas.microsoft.com/office/drawing/2014/main" id="{01A223D0-DEEE-EA45-BF69-F780FE660891}"/>
               </a:ext>
             </a:extLst>
           </p:cNvPr>
@@ -3356,22 +3336,15 @@
           </p:cNvPicPr>
           <p:nvPr/>
         </p:nvPicPr>
-        <p:blipFill>
-          <a:blip r:embed="rId2">
-            <a:extLst>
-              <a:ext uri="{96DAC541-7B7A-43D3-8B79-37D633B846F1}">
-                <asvg:svgBlip xmlns:asvg="http://schemas.microsoft.com/office/drawing/2016/SVG/main" r:embed="rId3"/>
-              </a:ext>
-            </a:extLst>
-          </a:blip>
-          <a:stretch>
-            <a:fillRect/>
-          </a:stretch>
+        <p:blipFill rotWithShape="1">
+          <a:blip r:embed="rId2"/>
+          <a:srcRect l="6592" t="8730" r="5935" b="81904"/>
+          <a:stretch/>
         </p:blipFill>
         <p:spPr>
           <a:xfrm>
-            <a:off x="1981200" y="685800"/>
-            <a:ext cx="8229600" cy="5486400"/>
+            <a:off x="1763485" y="3107871"/>
+            <a:ext cx="8665029" cy="642257"/>
           </a:xfrm>
           <a:prstGeom prst="rect">
             <a:avLst/>
@@ -3381,7 +3354,67 @@
     </p:spTree>
     <p:extLst>
       <p:ext uri="{BB962C8B-B14F-4D97-AF65-F5344CB8AC3E}">
-        <p14:creationId xmlns:p14="http://schemas.microsoft.com/office/powerpoint/2010/main" val="3702831589"/>
+        <p14:creationId xmlns:p14="http://schemas.microsoft.com/office/powerpoint/2010/main" val="1493160792"/>
+      </p:ext>
+    </p:extLst>
+  </p:cSld>
+  <p:clrMapOvr>
+    <a:masterClrMapping/>
+  </p:clrMapOvr>
+</p:sld>
+</file>
+
+<file path=ppt/slides/slide2.xml><?xml version="1.0" encoding="utf-8"?>
+<p:sld xmlns:a="http://schemas.openxmlformats.org/drawingml/2006/main" xmlns:r="http://schemas.openxmlformats.org/officeDocument/2006/relationships" xmlns:p="http://schemas.openxmlformats.org/presentationml/2006/main">
+  <p:cSld>
+    <p:spTree>
+      <p:nvGrpSpPr>
+        <p:cNvPr id="1" name=""/>
+        <p:cNvGrpSpPr/>
+        <p:nvPr/>
+      </p:nvGrpSpPr>
+      <p:grpSpPr>
+        <a:xfrm>
+          <a:off x="0" y="0"/>
+          <a:ext cx="0" cy="0"/>
+          <a:chOff x="0" y="0"/>
+          <a:chExt cx="0" cy="0"/>
+        </a:xfrm>
+      </p:grpSpPr>
+      <p:pic>
+        <p:nvPicPr>
+          <p:cNvPr id="5" name="Picture 4">
+            <a:extLst>
+              <a:ext uri="{FF2B5EF4-FFF2-40B4-BE49-F238E27FC236}">
+                <a16:creationId xmlns:a16="http://schemas.microsoft.com/office/drawing/2014/main" id="{1AD9EC3E-707D-A243-8DD6-B322C4AB907B}"/>
+              </a:ext>
+            </a:extLst>
+          </p:cNvPr>
+          <p:cNvPicPr>
+            <a:picLocks noChangeAspect="1"/>
+          </p:cNvPicPr>
+          <p:nvPr/>
+        </p:nvPicPr>
+        <p:blipFill>
+          <a:blip r:embed="rId2"/>
+          <a:stretch>
+            <a:fillRect/>
+          </a:stretch>
+        </p:blipFill>
+        <p:spPr>
+          <a:xfrm>
+            <a:off x="952500" y="0"/>
+            <a:ext cx="10287000" cy="6858000"/>
+          </a:xfrm>
+          <a:prstGeom prst="rect">
+            <a:avLst/>
+          </a:prstGeom>
+        </p:spPr>
+      </p:pic>
+    </p:spTree>
+    <p:extLst>
+      <p:ext uri="{BB962C8B-B14F-4D97-AF65-F5344CB8AC3E}">
+        <p14:creationId xmlns:p14="http://schemas.microsoft.com/office/powerpoint/2010/main" val="1592958931"/>
       </p:ext>
     </p:extLst>
   </p:cSld>

</xml_diff>